<commit_message>
Main slide format add
</commit_message>
<xml_diff>
--- a/Docs/Presentations/Slides/Capstone Showcase Active.pptx
+++ b/Docs/Presentations/Slides/Capstone Showcase Active.pptx
@@ -2,21 +2,17 @@
 <file path=ppt/presentation.xml><?xml version="1.0" encoding="utf-8"?>
 <p:presentation xmlns:a="http://schemas.openxmlformats.org/drawingml/2006/main" xmlns:r="http://schemas.openxmlformats.org/officeDocument/2006/relationships" xmlns:p="http://schemas.openxmlformats.org/presentationml/2006/main" saveSubsetFonts="1">
   <p:sldMasterIdLst>
-    <p:sldMasterId id="2147483648" r:id="rId1"/>
+    <p:sldMasterId id="2147483660" r:id="rId1"/>
   </p:sldMasterIdLst>
   <p:notesMasterIdLst>
-    <p:notesMasterId r:id="rId8"/>
+    <p:notesMasterId r:id="rId4"/>
   </p:notesMasterIdLst>
   <p:handoutMasterIdLst>
-    <p:handoutMasterId r:id="rId9"/>
+    <p:handoutMasterId r:id="rId5"/>
   </p:handoutMasterIdLst>
   <p:sldIdLst>
     <p:sldId id="257" r:id="rId2"/>
     <p:sldId id="256" r:id="rId3"/>
-    <p:sldId id="258" r:id="rId4"/>
-    <p:sldId id="259" r:id="rId5"/>
-    <p:sldId id="260" r:id="rId6"/>
-    <p:sldId id="261" r:id="rId7"/>
   </p:sldIdLst>
   <p:sldSz cx="12192000" cy="6858000"/>
   <p:notesSz cx="6858000" cy="9144000"/>
@@ -205,7 +201,7 @@
           <a:p>
             <a:fld id="{44E562D0-84FD-411E-8C3F-A36A948BC859}" type="datetimeFigureOut">
               <a:rPr lang="en-US" smtClean="0"/>
-              <a:t>6/4/2017</a:t>
+              <a:t>6/5/2017</a:t>
             </a:fld>
             <a:endParaRPr lang="en-US"/>
           </a:p>
@@ -370,7 +366,7 @@
           <a:p>
             <a:fld id="{66175D2C-1B39-43F9-A837-A8832EDEE424}" type="datetimeFigureOut">
               <a:rPr lang="en-US" smtClean="0"/>
-              <a:t>6/4/2017</a:t>
+              <a:t>6/5/2017</a:t>
             </a:fld>
             <a:endParaRPr lang="en-US"/>
           </a:p>
@@ -722,342 +718,6 @@
 </p:notes>
 </file>
 
-<file path=ppt/notesSlides/notesSlide2.xml><?xml version="1.0" encoding="utf-8"?>
-<p:notes xmlns:a="http://schemas.openxmlformats.org/drawingml/2006/main" xmlns:r="http://schemas.openxmlformats.org/officeDocument/2006/relationships" xmlns:p="http://schemas.openxmlformats.org/presentationml/2006/main">
-  <p:cSld>
-    <p:spTree>
-      <p:nvGrpSpPr>
-        <p:cNvPr id="1" name=""/>
-        <p:cNvGrpSpPr/>
-        <p:nvPr/>
-      </p:nvGrpSpPr>
-      <p:grpSpPr>
-        <a:xfrm>
-          <a:off x="0" y="0"/>
-          <a:ext cx="0" cy="0"/>
-          <a:chOff x="0" y="0"/>
-          <a:chExt cx="0" cy="0"/>
-        </a:xfrm>
-      </p:grpSpPr>
-      <p:sp>
-        <p:nvSpPr>
-          <p:cNvPr id="2" name="Slide Image Placeholder 1"/>
-          <p:cNvSpPr>
-            <a:spLocks noGrp="1" noRot="1" noChangeAspect="1"/>
-          </p:cNvSpPr>
-          <p:nvPr>
-            <p:ph type="sldImg"/>
-          </p:nvPr>
-        </p:nvSpPr>
-        <p:spPr/>
-      </p:sp>
-      <p:sp>
-        <p:nvSpPr>
-          <p:cNvPr id="3" name="Notes Placeholder 2"/>
-          <p:cNvSpPr>
-            <a:spLocks noGrp="1"/>
-          </p:cNvSpPr>
-          <p:nvPr>
-            <p:ph type="body" idx="1"/>
-          </p:nvPr>
-        </p:nvSpPr>
-        <p:spPr/>
-        <p:txBody>
-          <a:bodyPr/>
-          <a:lstStyle/>
-          <a:p>
-            <a:endParaRPr lang="en-US"/>
-          </a:p>
-        </p:txBody>
-      </p:sp>
-      <p:sp>
-        <p:nvSpPr>
-          <p:cNvPr id="4" name="Slide Number Placeholder 3"/>
-          <p:cNvSpPr>
-            <a:spLocks noGrp="1"/>
-          </p:cNvSpPr>
-          <p:nvPr>
-            <p:ph type="sldNum" sz="quarter" idx="10"/>
-          </p:nvPr>
-        </p:nvSpPr>
-        <p:spPr/>
-        <p:txBody>
-          <a:bodyPr/>
-          <a:lstStyle/>
-          <a:p>
-            <a:fld id="{41270EAE-2722-4055-9DC6-0148D79BD176}" type="slidenum">
-              <a:rPr lang="en-US" smtClean="0"/>
-              <a:t>3</a:t>
-            </a:fld>
-            <a:endParaRPr lang="en-US"/>
-          </a:p>
-        </p:txBody>
-      </p:sp>
-    </p:spTree>
-    <p:extLst>
-      <p:ext uri="{BB962C8B-B14F-4D97-AF65-F5344CB8AC3E}">
-        <p14:creationId xmlns:p14="http://schemas.microsoft.com/office/powerpoint/2010/main" val="2596773669"/>
-      </p:ext>
-    </p:extLst>
-  </p:cSld>
-  <p:clrMapOvr>
-    <a:masterClrMapping/>
-  </p:clrMapOvr>
-</p:notes>
-</file>
-
-<file path=ppt/notesSlides/notesSlide3.xml><?xml version="1.0" encoding="utf-8"?>
-<p:notes xmlns:a="http://schemas.openxmlformats.org/drawingml/2006/main" xmlns:r="http://schemas.openxmlformats.org/officeDocument/2006/relationships" xmlns:p="http://schemas.openxmlformats.org/presentationml/2006/main">
-  <p:cSld>
-    <p:spTree>
-      <p:nvGrpSpPr>
-        <p:cNvPr id="1" name=""/>
-        <p:cNvGrpSpPr/>
-        <p:nvPr/>
-      </p:nvGrpSpPr>
-      <p:grpSpPr>
-        <a:xfrm>
-          <a:off x="0" y="0"/>
-          <a:ext cx="0" cy="0"/>
-          <a:chOff x="0" y="0"/>
-          <a:chExt cx="0" cy="0"/>
-        </a:xfrm>
-      </p:grpSpPr>
-      <p:sp>
-        <p:nvSpPr>
-          <p:cNvPr id="2" name="Slide Image Placeholder 1"/>
-          <p:cNvSpPr>
-            <a:spLocks noGrp="1" noRot="1" noChangeAspect="1"/>
-          </p:cNvSpPr>
-          <p:nvPr>
-            <p:ph type="sldImg"/>
-          </p:nvPr>
-        </p:nvSpPr>
-        <p:spPr/>
-      </p:sp>
-      <p:sp>
-        <p:nvSpPr>
-          <p:cNvPr id="3" name="Notes Placeholder 2"/>
-          <p:cNvSpPr>
-            <a:spLocks noGrp="1"/>
-          </p:cNvSpPr>
-          <p:nvPr>
-            <p:ph type="body" idx="1"/>
-          </p:nvPr>
-        </p:nvSpPr>
-        <p:spPr/>
-        <p:txBody>
-          <a:bodyPr/>
-          <a:lstStyle/>
-          <a:p>
-            <a:endParaRPr lang="en-US"/>
-          </a:p>
-        </p:txBody>
-      </p:sp>
-      <p:sp>
-        <p:nvSpPr>
-          <p:cNvPr id="4" name="Slide Number Placeholder 3"/>
-          <p:cNvSpPr>
-            <a:spLocks noGrp="1"/>
-          </p:cNvSpPr>
-          <p:nvPr>
-            <p:ph type="sldNum" sz="quarter" idx="10"/>
-          </p:nvPr>
-        </p:nvSpPr>
-        <p:spPr/>
-        <p:txBody>
-          <a:bodyPr/>
-          <a:lstStyle/>
-          <a:p>
-            <a:fld id="{41270EAE-2722-4055-9DC6-0148D79BD176}" type="slidenum">
-              <a:rPr lang="en-US" smtClean="0"/>
-              <a:t>4</a:t>
-            </a:fld>
-            <a:endParaRPr lang="en-US"/>
-          </a:p>
-        </p:txBody>
-      </p:sp>
-    </p:spTree>
-    <p:extLst>
-      <p:ext uri="{BB962C8B-B14F-4D97-AF65-F5344CB8AC3E}">
-        <p14:creationId xmlns:p14="http://schemas.microsoft.com/office/powerpoint/2010/main" val="2755330536"/>
-      </p:ext>
-    </p:extLst>
-  </p:cSld>
-  <p:clrMapOvr>
-    <a:masterClrMapping/>
-  </p:clrMapOvr>
-</p:notes>
-</file>
-
-<file path=ppt/notesSlides/notesSlide4.xml><?xml version="1.0" encoding="utf-8"?>
-<p:notes xmlns:a="http://schemas.openxmlformats.org/drawingml/2006/main" xmlns:r="http://schemas.openxmlformats.org/officeDocument/2006/relationships" xmlns:p="http://schemas.openxmlformats.org/presentationml/2006/main">
-  <p:cSld>
-    <p:spTree>
-      <p:nvGrpSpPr>
-        <p:cNvPr id="1" name=""/>
-        <p:cNvGrpSpPr/>
-        <p:nvPr/>
-      </p:nvGrpSpPr>
-      <p:grpSpPr>
-        <a:xfrm>
-          <a:off x="0" y="0"/>
-          <a:ext cx="0" cy="0"/>
-          <a:chOff x="0" y="0"/>
-          <a:chExt cx="0" cy="0"/>
-        </a:xfrm>
-      </p:grpSpPr>
-      <p:sp>
-        <p:nvSpPr>
-          <p:cNvPr id="2" name="Slide Image Placeholder 1"/>
-          <p:cNvSpPr>
-            <a:spLocks noGrp="1" noRot="1" noChangeAspect="1"/>
-          </p:cNvSpPr>
-          <p:nvPr>
-            <p:ph type="sldImg"/>
-          </p:nvPr>
-        </p:nvSpPr>
-        <p:spPr/>
-      </p:sp>
-      <p:sp>
-        <p:nvSpPr>
-          <p:cNvPr id="3" name="Notes Placeholder 2"/>
-          <p:cNvSpPr>
-            <a:spLocks noGrp="1"/>
-          </p:cNvSpPr>
-          <p:nvPr>
-            <p:ph type="body" idx="1"/>
-          </p:nvPr>
-        </p:nvSpPr>
-        <p:spPr/>
-        <p:txBody>
-          <a:bodyPr/>
-          <a:lstStyle/>
-          <a:p>
-            <a:endParaRPr lang="en-US"/>
-          </a:p>
-        </p:txBody>
-      </p:sp>
-      <p:sp>
-        <p:nvSpPr>
-          <p:cNvPr id="4" name="Slide Number Placeholder 3"/>
-          <p:cNvSpPr>
-            <a:spLocks noGrp="1"/>
-          </p:cNvSpPr>
-          <p:nvPr>
-            <p:ph type="sldNum" sz="quarter" idx="10"/>
-          </p:nvPr>
-        </p:nvSpPr>
-        <p:spPr/>
-        <p:txBody>
-          <a:bodyPr/>
-          <a:lstStyle/>
-          <a:p>
-            <a:fld id="{41270EAE-2722-4055-9DC6-0148D79BD176}" type="slidenum">
-              <a:rPr lang="en-US" smtClean="0"/>
-              <a:t>5</a:t>
-            </a:fld>
-            <a:endParaRPr lang="en-US"/>
-          </a:p>
-        </p:txBody>
-      </p:sp>
-    </p:spTree>
-    <p:extLst>
-      <p:ext uri="{BB962C8B-B14F-4D97-AF65-F5344CB8AC3E}">
-        <p14:creationId xmlns:p14="http://schemas.microsoft.com/office/powerpoint/2010/main" val="424856072"/>
-      </p:ext>
-    </p:extLst>
-  </p:cSld>
-  <p:clrMapOvr>
-    <a:masterClrMapping/>
-  </p:clrMapOvr>
-</p:notes>
-</file>
-
-<file path=ppt/notesSlides/notesSlide5.xml><?xml version="1.0" encoding="utf-8"?>
-<p:notes xmlns:a="http://schemas.openxmlformats.org/drawingml/2006/main" xmlns:r="http://schemas.openxmlformats.org/officeDocument/2006/relationships" xmlns:p="http://schemas.openxmlformats.org/presentationml/2006/main">
-  <p:cSld>
-    <p:spTree>
-      <p:nvGrpSpPr>
-        <p:cNvPr id="1" name=""/>
-        <p:cNvGrpSpPr/>
-        <p:nvPr/>
-      </p:nvGrpSpPr>
-      <p:grpSpPr>
-        <a:xfrm>
-          <a:off x="0" y="0"/>
-          <a:ext cx="0" cy="0"/>
-          <a:chOff x="0" y="0"/>
-          <a:chExt cx="0" cy="0"/>
-        </a:xfrm>
-      </p:grpSpPr>
-      <p:sp>
-        <p:nvSpPr>
-          <p:cNvPr id="2" name="Slide Image Placeholder 1"/>
-          <p:cNvSpPr>
-            <a:spLocks noGrp="1" noRot="1" noChangeAspect="1"/>
-          </p:cNvSpPr>
-          <p:nvPr>
-            <p:ph type="sldImg"/>
-          </p:nvPr>
-        </p:nvSpPr>
-        <p:spPr/>
-      </p:sp>
-      <p:sp>
-        <p:nvSpPr>
-          <p:cNvPr id="3" name="Notes Placeholder 2"/>
-          <p:cNvSpPr>
-            <a:spLocks noGrp="1"/>
-          </p:cNvSpPr>
-          <p:nvPr>
-            <p:ph type="body" idx="1"/>
-          </p:nvPr>
-        </p:nvSpPr>
-        <p:spPr/>
-        <p:txBody>
-          <a:bodyPr/>
-          <a:lstStyle/>
-          <a:p>
-            <a:endParaRPr lang="en-US"/>
-          </a:p>
-        </p:txBody>
-      </p:sp>
-      <p:sp>
-        <p:nvSpPr>
-          <p:cNvPr id="4" name="Slide Number Placeholder 3"/>
-          <p:cNvSpPr>
-            <a:spLocks noGrp="1"/>
-          </p:cNvSpPr>
-          <p:nvPr>
-            <p:ph type="sldNum" sz="quarter" idx="10"/>
-          </p:nvPr>
-        </p:nvSpPr>
-        <p:spPr/>
-        <p:txBody>
-          <a:bodyPr/>
-          <a:lstStyle/>
-          <a:p>
-            <a:fld id="{41270EAE-2722-4055-9DC6-0148D79BD176}" type="slidenum">
-              <a:rPr lang="en-US" smtClean="0"/>
-              <a:t>6</a:t>
-            </a:fld>
-            <a:endParaRPr lang="en-US"/>
-          </a:p>
-        </p:txBody>
-      </p:sp>
-    </p:spTree>
-    <p:extLst>
-      <p:ext uri="{BB962C8B-B14F-4D97-AF65-F5344CB8AC3E}">
-        <p14:creationId xmlns:p14="http://schemas.microsoft.com/office/powerpoint/2010/main" val="3132093504"/>
-      </p:ext>
-    </p:extLst>
-  </p:cSld>
-  <p:clrMapOvr>
-    <a:masterClrMapping/>
-  </p:clrMapOvr>
-</p:notes>
-</file>
-
 <file path=ppt/slideLayouts/slideLayout1.xml><?xml version="1.0" encoding="utf-8"?>
 <p:sldLayout xmlns:a="http://schemas.openxmlformats.org/drawingml/2006/main" xmlns:r="http://schemas.openxmlformats.org/officeDocument/2006/relationships" xmlns:p="http://schemas.openxmlformats.org/presentationml/2006/main" type="title" preserve="1">
   <p:cSld name="Title Slide">
@@ -1189,7 +849,7 @@
           <a:p>
             <a:fld id="{A3262095-DDFB-454B-A6DA-90DBA20ABDC0}" type="datetime1">
               <a:rPr lang="en-US" smtClean="0"/>
-              <a:t>6/4/2017</a:t>
+              <a:t>6/5/2017</a:t>
             </a:fld>
             <a:endParaRPr lang="en-US"/>
           </a:p>
@@ -1240,7 +900,7 @@
     </p:spTree>
     <p:extLst>
       <p:ext uri="{BB962C8B-B14F-4D97-AF65-F5344CB8AC3E}">
-        <p14:creationId xmlns:p14="http://schemas.microsoft.com/office/powerpoint/2010/main" val="1861972270"/>
+        <p14:creationId xmlns:p14="http://schemas.microsoft.com/office/powerpoint/2010/main" val="2679606668"/>
       </p:ext>
     </p:extLst>
   </p:cSld>
@@ -1308,7 +968,7 @@
             <a:pPr lvl="0"/>
             <a:r>
               <a:rPr lang="en-US" smtClean="0"/>
-              <a:t>Click to edit Master text styles</a:t>
+              <a:t>Edit Master text styles</a:t>
             </a:r>
           </a:p>
           <a:p>
@@ -1359,7 +1019,7 @@
           <a:p>
             <a:fld id="{B5E7B701-CC3D-4513-A491-644406E6E0F3}" type="datetime1">
               <a:rPr lang="en-US" smtClean="0"/>
-              <a:t>6/4/2017</a:t>
+              <a:t>6/5/2017</a:t>
             </a:fld>
             <a:endParaRPr lang="en-US"/>
           </a:p>
@@ -1410,7 +1070,7 @@
     </p:spTree>
     <p:extLst>
       <p:ext uri="{BB962C8B-B14F-4D97-AF65-F5344CB8AC3E}">
-        <p14:creationId xmlns:p14="http://schemas.microsoft.com/office/powerpoint/2010/main" val="2885852407"/>
+        <p14:creationId xmlns:p14="http://schemas.microsoft.com/office/powerpoint/2010/main" val="3288908872"/>
       </p:ext>
     </p:extLst>
   </p:cSld>
@@ -1488,7 +1148,7 @@
             <a:pPr lvl="0"/>
             <a:r>
               <a:rPr lang="en-US" smtClean="0"/>
-              <a:t>Click to edit Master text styles</a:t>
+              <a:t>Edit Master text styles</a:t>
             </a:r>
           </a:p>
           <a:p>
@@ -1539,7 +1199,7 @@
           <a:p>
             <a:fld id="{06394014-7AF7-469C-99A4-D8404E64CDA7}" type="datetime1">
               <a:rPr lang="en-US" smtClean="0"/>
-              <a:t>6/4/2017</a:t>
+              <a:t>6/5/2017</a:t>
             </a:fld>
             <a:endParaRPr lang="en-US"/>
           </a:p>
@@ -1590,7 +1250,7 @@
     </p:spTree>
     <p:extLst>
       <p:ext uri="{BB962C8B-B14F-4D97-AF65-F5344CB8AC3E}">
-        <p14:creationId xmlns:p14="http://schemas.microsoft.com/office/powerpoint/2010/main" val="2647824207"/>
+        <p14:creationId xmlns:p14="http://schemas.microsoft.com/office/powerpoint/2010/main" val="3178751063"/>
       </p:ext>
     </p:extLst>
   </p:cSld>
@@ -1658,7 +1318,7 @@
             <a:pPr lvl="0"/>
             <a:r>
               <a:rPr lang="en-US" smtClean="0"/>
-              <a:t>Click to edit Master text styles</a:t>
+              <a:t>Edit Master text styles</a:t>
             </a:r>
           </a:p>
           <a:p>
@@ -1709,7 +1369,7 @@
           <a:p>
             <a:fld id="{F0E725F3-5DDC-43C9-9B04-B0DA72289B5F}" type="datetime1">
               <a:rPr lang="en-US" smtClean="0"/>
-              <a:t>6/4/2017</a:t>
+              <a:t>6/5/2017</a:t>
             </a:fld>
             <a:endParaRPr lang="en-US"/>
           </a:p>
@@ -1760,7 +1420,7 @@
     </p:spTree>
     <p:extLst>
       <p:ext uri="{BB962C8B-B14F-4D97-AF65-F5344CB8AC3E}">
-        <p14:creationId xmlns:p14="http://schemas.microsoft.com/office/powerpoint/2010/main" val="2048086189"/>
+        <p14:creationId xmlns:p14="http://schemas.microsoft.com/office/powerpoint/2010/main" val="1449146499"/>
       </p:ext>
     </p:extLst>
   </p:cSld>
@@ -1933,7 +1593,7 @@
             <a:pPr lvl="0"/>
             <a:r>
               <a:rPr lang="en-US" smtClean="0"/>
-              <a:t>Click to edit Master text styles</a:t>
+              <a:t>Edit Master text styles</a:t>
             </a:r>
           </a:p>
         </p:txBody>
@@ -1955,7 +1615,7 @@
           <a:p>
             <a:fld id="{EC13F56B-DA0B-4D08-9588-D2C5E58A8A05}" type="datetime1">
               <a:rPr lang="en-US" smtClean="0"/>
-              <a:t>6/4/2017</a:t>
+              <a:t>6/5/2017</a:t>
             </a:fld>
             <a:endParaRPr lang="en-US"/>
           </a:p>
@@ -2006,7 +1666,7 @@
     </p:spTree>
     <p:extLst>
       <p:ext uri="{BB962C8B-B14F-4D97-AF65-F5344CB8AC3E}">
-        <p14:creationId xmlns:p14="http://schemas.microsoft.com/office/powerpoint/2010/main" val="6184159"/>
+        <p14:creationId xmlns:p14="http://schemas.microsoft.com/office/powerpoint/2010/main" val="3925590744"/>
       </p:ext>
     </p:extLst>
   </p:cSld>
@@ -2079,7 +1739,7 @@
             <a:pPr lvl="0"/>
             <a:r>
               <a:rPr lang="en-US" smtClean="0"/>
-              <a:t>Click to edit Master text styles</a:t>
+              <a:t>Edit Master text styles</a:t>
             </a:r>
           </a:p>
           <a:p>
@@ -2136,7 +1796,7 @@
             <a:pPr lvl="0"/>
             <a:r>
               <a:rPr lang="en-US" smtClean="0"/>
-              <a:t>Click to edit Master text styles</a:t>
+              <a:t>Edit Master text styles</a:t>
             </a:r>
           </a:p>
           <a:p>
@@ -2187,7 +1847,7 @@
           <a:p>
             <a:fld id="{299C329F-D0C2-462C-B78C-73BED02F6B3A}" type="datetime1">
               <a:rPr lang="en-US" smtClean="0"/>
-              <a:t>6/4/2017</a:t>
+              <a:t>6/5/2017</a:t>
             </a:fld>
             <a:endParaRPr lang="en-US"/>
           </a:p>
@@ -2238,7 +1898,7 @@
     </p:spTree>
     <p:extLst>
       <p:ext uri="{BB962C8B-B14F-4D97-AF65-F5344CB8AC3E}">
-        <p14:creationId xmlns:p14="http://schemas.microsoft.com/office/powerpoint/2010/main" val="3324599788"/>
+        <p14:creationId xmlns:p14="http://schemas.microsoft.com/office/powerpoint/2010/main" val="2125476987"/>
       </p:ext>
     </p:extLst>
   </p:cSld>
@@ -2353,7 +2013,7 @@
             <a:pPr lvl="0"/>
             <a:r>
               <a:rPr lang="en-US" smtClean="0"/>
-              <a:t>Click to edit Master text styles</a:t>
+              <a:t>Edit Master text styles</a:t>
             </a:r>
           </a:p>
         </p:txBody>
@@ -2381,7 +2041,7 @@
             <a:pPr lvl="0"/>
             <a:r>
               <a:rPr lang="en-US" smtClean="0"/>
-              <a:t>Click to edit Master text styles</a:t>
+              <a:t>Edit Master text styles</a:t>
             </a:r>
           </a:p>
           <a:p>
@@ -2475,7 +2135,7 @@
             <a:pPr lvl="0"/>
             <a:r>
               <a:rPr lang="en-US" smtClean="0"/>
-              <a:t>Click to edit Master text styles</a:t>
+              <a:t>Edit Master text styles</a:t>
             </a:r>
           </a:p>
         </p:txBody>
@@ -2503,7 +2163,7 @@
             <a:pPr lvl="0"/>
             <a:r>
               <a:rPr lang="en-US" smtClean="0"/>
-              <a:t>Click to edit Master text styles</a:t>
+              <a:t>Edit Master text styles</a:t>
             </a:r>
           </a:p>
           <a:p>
@@ -2554,7 +2214,7 @@
           <a:p>
             <a:fld id="{D9794D81-9A86-4611-8F90-73F29CC9E4B5}" type="datetime1">
               <a:rPr lang="en-US" smtClean="0"/>
-              <a:t>6/4/2017</a:t>
+              <a:t>6/5/2017</a:t>
             </a:fld>
             <a:endParaRPr lang="en-US"/>
           </a:p>
@@ -2605,7 +2265,7 @@
     </p:spTree>
     <p:extLst>
       <p:ext uri="{BB962C8B-B14F-4D97-AF65-F5344CB8AC3E}">
-        <p14:creationId xmlns:p14="http://schemas.microsoft.com/office/powerpoint/2010/main" val="243358455"/>
+        <p14:creationId xmlns:p14="http://schemas.microsoft.com/office/powerpoint/2010/main" val="163219649"/>
       </p:ext>
     </p:extLst>
   </p:cSld>
@@ -2672,7 +2332,7 @@
           <a:p>
             <a:fld id="{D68F34C9-1C3C-47F7-B45B-284099DAC214}" type="datetime1">
               <a:rPr lang="en-US" smtClean="0"/>
-              <a:t>6/4/2017</a:t>
+              <a:t>6/5/2017</a:t>
             </a:fld>
             <a:endParaRPr lang="en-US"/>
           </a:p>
@@ -2723,7 +2383,7 @@
     </p:spTree>
     <p:extLst>
       <p:ext uri="{BB962C8B-B14F-4D97-AF65-F5344CB8AC3E}">
-        <p14:creationId xmlns:p14="http://schemas.microsoft.com/office/powerpoint/2010/main" val="1863306984"/>
+        <p14:creationId xmlns:p14="http://schemas.microsoft.com/office/powerpoint/2010/main" val="1938348602"/>
       </p:ext>
     </p:extLst>
   </p:cSld>
@@ -2767,7 +2427,7 @@
           <a:p>
             <a:fld id="{1967B72D-8EFB-4381-8B1D-B7106AB7E466}" type="datetime1">
               <a:rPr lang="en-US" smtClean="0"/>
-              <a:t>6/4/2017</a:t>
+              <a:t>6/5/2017</a:t>
             </a:fld>
             <a:endParaRPr lang="en-US"/>
           </a:p>
@@ -2818,7 +2478,7 @@
     </p:spTree>
     <p:extLst>
       <p:ext uri="{BB962C8B-B14F-4D97-AF65-F5344CB8AC3E}">
-        <p14:creationId xmlns:p14="http://schemas.microsoft.com/office/powerpoint/2010/main" val="1584948829"/>
+        <p14:creationId xmlns:p14="http://schemas.microsoft.com/office/powerpoint/2010/main" val="2021614471"/>
       </p:ext>
     </p:extLst>
   </p:cSld>
@@ -2928,7 +2588,7 @@
             <a:pPr lvl="0"/>
             <a:r>
               <a:rPr lang="en-US" smtClean="0"/>
-              <a:t>Click to edit Master text styles</a:t>
+              <a:t>Edit Master text styles</a:t>
             </a:r>
           </a:p>
           <a:p>
@@ -3022,7 +2682,7 @@
             <a:pPr lvl="0"/>
             <a:r>
               <a:rPr lang="en-US" smtClean="0"/>
-              <a:t>Click to edit Master text styles</a:t>
+              <a:t>Edit Master text styles</a:t>
             </a:r>
           </a:p>
         </p:txBody>
@@ -3044,7 +2704,7 @@
           <a:p>
             <a:fld id="{5EDFAFED-D5AA-4784-B428-C75142A947D6}" type="datetime1">
               <a:rPr lang="en-US" smtClean="0"/>
-              <a:t>6/4/2017</a:t>
+              <a:t>6/5/2017</a:t>
             </a:fld>
             <a:endParaRPr lang="en-US"/>
           </a:p>
@@ -3095,7 +2755,7 @@
     </p:spTree>
     <p:extLst>
       <p:ext uri="{BB962C8B-B14F-4D97-AF65-F5344CB8AC3E}">
-        <p14:creationId xmlns:p14="http://schemas.microsoft.com/office/powerpoint/2010/main" val="2211316120"/>
+        <p14:creationId xmlns:p14="http://schemas.microsoft.com/office/powerpoint/2010/main" val="463069919"/>
       </p:ext>
     </p:extLst>
   </p:cSld>
@@ -3275,7 +2935,7 @@
             <a:pPr lvl="0"/>
             <a:r>
               <a:rPr lang="en-US" smtClean="0"/>
-              <a:t>Click to edit Master text styles</a:t>
+              <a:t>Edit Master text styles</a:t>
             </a:r>
           </a:p>
         </p:txBody>
@@ -3297,7 +2957,7 @@
           <a:p>
             <a:fld id="{43BCD765-5746-4CF0-A4A3-8D605663D487}" type="datetime1">
               <a:rPr lang="en-US" smtClean="0"/>
-              <a:t>6/4/2017</a:t>
+              <a:t>6/5/2017</a:t>
             </a:fld>
             <a:endParaRPr lang="en-US"/>
           </a:p>
@@ -3348,7 +3008,7 @@
     </p:spTree>
     <p:extLst>
       <p:ext uri="{BB962C8B-B14F-4D97-AF65-F5344CB8AC3E}">
-        <p14:creationId xmlns:p14="http://schemas.microsoft.com/office/powerpoint/2010/main" val="2200688439"/>
+        <p14:creationId xmlns:p14="http://schemas.microsoft.com/office/powerpoint/2010/main" val="685838457"/>
       </p:ext>
     </p:extLst>
   </p:cSld>
@@ -3362,7 +3022,7 @@
 <p:sldMaster xmlns:a="http://schemas.openxmlformats.org/drawingml/2006/main" xmlns:r="http://schemas.openxmlformats.org/officeDocument/2006/relationships" xmlns:p="http://schemas.openxmlformats.org/presentationml/2006/main">
   <p:cSld>
     <p:bg>
-      <p:bgRef idx="1003">
+      <p:bgRef idx="1001">
         <a:schemeClr val="bg1"/>
       </p:bgRef>
     </p:bg>
@@ -3441,7 +3101,7 @@
             <a:pPr lvl="0"/>
             <a:r>
               <a:rPr lang="en-US" smtClean="0"/>
-              <a:t>Click to edit Master text styles</a:t>
+              <a:t>Edit Master text styles</a:t>
             </a:r>
           </a:p>
           <a:p>
@@ -3510,7 +3170,7 @@
           <a:p>
             <a:fld id="{9CCE6136-CE43-4DBF-98E4-9D97BE59DE46}" type="datetime1">
               <a:rPr lang="en-US" smtClean="0"/>
-              <a:t>6/4/2017</a:t>
+              <a:t>6/5/2017</a:t>
             </a:fld>
             <a:endParaRPr lang="en-US"/>
           </a:p>
@@ -3597,23 +3257,23 @@
     </p:spTree>
     <p:extLst>
       <p:ext uri="{BB962C8B-B14F-4D97-AF65-F5344CB8AC3E}">
-        <p14:creationId xmlns:p14="http://schemas.microsoft.com/office/powerpoint/2010/main" val="1770509783"/>
+        <p14:creationId xmlns:p14="http://schemas.microsoft.com/office/powerpoint/2010/main" val="1682383942"/>
       </p:ext>
     </p:extLst>
   </p:cSld>
   <p:clrMap bg1="lt1" tx1="dk1" bg2="lt2" tx2="dk2" accent1="accent1" accent2="accent2" accent3="accent3" accent4="accent4" accent5="accent5" accent6="accent6" hlink="hlink" folHlink="folHlink"/>
   <p:sldLayoutIdLst>
-    <p:sldLayoutId id="2147483649" r:id="rId1"/>
-    <p:sldLayoutId id="2147483650" r:id="rId2"/>
-    <p:sldLayoutId id="2147483651" r:id="rId3"/>
-    <p:sldLayoutId id="2147483652" r:id="rId4"/>
-    <p:sldLayoutId id="2147483653" r:id="rId5"/>
-    <p:sldLayoutId id="2147483654" r:id="rId6"/>
-    <p:sldLayoutId id="2147483655" r:id="rId7"/>
-    <p:sldLayoutId id="2147483656" r:id="rId8"/>
-    <p:sldLayoutId id="2147483657" r:id="rId9"/>
-    <p:sldLayoutId id="2147483658" r:id="rId10"/>
-    <p:sldLayoutId id="2147483659" r:id="rId11"/>
+    <p:sldLayoutId id="2147483661" r:id="rId1"/>
+    <p:sldLayoutId id="2147483662" r:id="rId2"/>
+    <p:sldLayoutId id="2147483663" r:id="rId3"/>
+    <p:sldLayoutId id="2147483664" r:id="rId4"/>
+    <p:sldLayoutId id="2147483665" r:id="rId5"/>
+    <p:sldLayoutId id="2147483666" r:id="rId6"/>
+    <p:sldLayoutId id="2147483667" r:id="rId7"/>
+    <p:sldLayoutId id="2147483668" r:id="rId8"/>
+    <p:sldLayoutId id="2147483669" r:id="rId9"/>
+    <p:sldLayoutId id="2147483670" r:id="rId10"/>
+    <p:sldLayoutId id="2147483671" r:id="rId11"/>
   </p:sldLayoutIdLst>
   <p:hf hdr="0" ftr="0" dt="0"/>
   <p:txStyles>
@@ -4267,16 +3927,25 @@
             <p:ph type="sldNum" sz="quarter" idx="12"/>
           </p:nvPr>
         </p:nvSpPr>
-        <p:spPr/>
+        <p:spPr>
+          <a:xfrm>
+            <a:off x="9306059" y="6438513"/>
+            <a:ext cx="2743200" cy="365125"/>
+          </a:xfrm>
+        </p:spPr>
         <p:txBody>
           <a:bodyPr/>
           <a:lstStyle/>
           <a:p>
             <a:fld id="{27225834-A5F4-4780-A9FC-586FB30F9BB0}" type="slidenum">
-              <a:rPr lang="en-US" smtClean="0"/>
+              <a:rPr lang="en-US" smtClean="0">
+                <a:latin typeface="Garamond" panose="02020404030301010803" pitchFamily="18" charset="0"/>
+              </a:rPr>
               <a:t>2</a:t>
             </a:fld>
-            <a:endParaRPr lang="en-US" dirty="0"/>
+            <a:endParaRPr lang="en-US" dirty="0">
+              <a:latin typeface="Garamond" panose="02020404030301010803" pitchFamily="18" charset="0"/>
+            </a:endParaRPr>
           </a:p>
         </p:txBody>
       </p:sp>
@@ -4288,8 +3957,8 @@
         </p:nvSpPr>
         <p:spPr>
           <a:xfrm>
-            <a:off x="0" y="6352143"/>
-            <a:ext cx="6422592" cy="369332"/>
+            <a:off x="128788" y="6482577"/>
+            <a:ext cx="4201920" cy="276999"/>
           </a:xfrm>
           <a:prstGeom prst="rect">
             <a:avLst/>
@@ -4303,14 +3972,14 @@
           <a:lstStyle/>
           <a:p>
             <a:r>
-              <a:rPr lang="en-US" dirty="0" smtClean="0">
-                <a:latin typeface="Times New Roman" panose="02020603050405020304" pitchFamily="18" charset="0"/>
+              <a:rPr lang="en-US" sz="1200" dirty="0" smtClean="0">
+                <a:latin typeface="Garamond" panose="02020404030301010803" pitchFamily="18" charset="0"/>
                 <a:cs typeface="Times New Roman" panose="02020603050405020304" pitchFamily="18" charset="0"/>
               </a:rPr>
               <a:t>Portland State Aerospace Society | Electric Propellant Feed System</a:t>
             </a:r>
-            <a:endParaRPr lang="en-US" dirty="0">
-              <a:latin typeface="Times New Roman" panose="02020603050405020304" pitchFamily="18" charset="0"/>
+            <a:endParaRPr lang="en-US" sz="1200" dirty="0">
+              <a:latin typeface="Garamond" panose="02020404030301010803" pitchFamily="18" charset="0"/>
               <a:cs typeface="Times New Roman" panose="02020603050405020304" pitchFamily="18" charset="0"/>
             </a:endParaRPr>
           </a:p>
@@ -4320,390 +3989,6 @@
     <p:extLst>
       <p:ext uri="{BB962C8B-B14F-4D97-AF65-F5344CB8AC3E}">
         <p14:creationId xmlns:p14="http://schemas.microsoft.com/office/powerpoint/2010/main" val="1843846498"/>
-      </p:ext>
-    </p:extLst>
-  </p:cSld>
-  <p:clrMapOvr>
-    <a:masterClrMapping/>
-  </p:clrMapOvr>
-  <p:timing>
-    <p:tnLst>
-      <p:par>
-        <p:cTn id="1" dur="indefinite" restart="never" nodeType="tmRoot"/>
-      </p:par>
-    </p:tnLst>
-  </p:timing>
-</p:sld>
-</file>
-
-<file path=ppt/slides/slide3.xml><?xml version="1.0" encoding="utf-8"?>
-<p:sld xmlns:a="http://schemas.openxmlformats.org/drawingml/2006/main" xmlns:r="http://schemas.openxmlformats.org/officeDocument/2006/relationships" xmlns:p="http://schemas.openxmlformats.org/presentationml/2006/main">
-  <p:cSld>
-    <p:spTree>
-      <p:nvGrpSpPr>
-        <p:cNvPr id="1" name=""/>
-        <p:cNvGrpSpPr/>
-        <p:nvPr/>
-      </p:nvGrpSpPr>
-      <p:grpSpPr>
-        <a:xfrm>
-          <a:off x="0" y="0"/>
-          <a:ext cx="0" cy="0"/>
-          <a:chOff x="0" y="0"/>
-          <a:chExt cx="0" cy="0"/>
-        </a:xfrm>
-      </p:grpSpPr>
-      <p:sp>
-        <p:nvSpPr>
-          <p:cNvPr id="4" name="Slide Number Placeholder 3"/>
-          <p:cNvSpPr>
-            <a:spLocks noGrp="1"/>
-          </p:cNvSpPr>
-          <p:nvPr>
-            <p:ph type="sldNum" sz="quarter" idx="12"/>
-          </p:nvPr>
-        </p:nvSpPr>
-        <p:spPr/>
-        <p:txBody>
-          <a:bodyPr/>
-          <a:lstStyle/>
-          <a:p>
-            <a:fld id="{27225834-A5F4-4780-A9FC-586FB30F9BB0}" type="slidenum">
-              <a:rPr lang="en-US" smtClean="0"/>
-              <a:t>3</a:t>
-            </a:fld>
-            <a:endParaRPr lang="en-US" dirty="0"/>
-          </a:p>
-        </p:txBody>
-      </p:sp>
-      <p:sp>
-        <p:nvSpPr>
-          <p:cNvPr id="19" name="TextBox 18"/>
-          <p:cNvSpPr txBox="1"/>
-          <p:nvPr/>
-        </p:nvSpPr>
-        <p:spPr>
-          <a:xfrm>
-            <a:off x="0" y="6352143"/>
-            <a:ext cx="6422592" cy="369332"/>
-          </a:xfrm>
-          <a:prstGeom prst="rect">
-            <a:avLst/>
-          </a:prstGeom>
-          <a:noFill/>
-        </p:spPr>
-        <p:txBody>
-          <a:bodyPr wrap="none" rtlCol="0">
-            <a:spAutoFit/>
-          </a:bodyPr>
-          <a:lstStyle/>
-          <a:p>
-            <a:r>
-              <a:rPr lang="en-US" dirty="0" smtClean="0">
-                <a:latin typeface="Times New Roman" panose="02020603050405020304" pitchFamily="18" charset="0"/>
-                <a:cs typeface="Times New Roman" panose="02020603050405020304" pitchFamily="18" charset="0"/>
-              </a:rPr>
-              <a:t>Portland State Aerospace Society | Electric Propellant Feed System</a:t>
-            </a:r>
-            <a:endParaRPr lang="en-US" dirty="0">
-              <a:latin typeface="Times New Roman" panose="02020603050405020304" pitchFamily="18" charset="0"/>
-              <a:cs typeface="Times New Roman" panose="02020603050405020304" pitchFamily="18" charset="0"/>
-            </a:endParaRPr>
-          </a:p>
-        </p:txBody>
-      </p:sp>
-    </p:spTree>
-    <p:extLst>
-      <p:ext uri="{BB962C8B-B14F-4D97-AF65-F5344CB8AC3E}">
-        <p14:creationId xmlns:p14="http://schemas.microsoft.com/office/powerpoint/2010/main" val="3907113847"/>
-      </p:ext>
-    </p:extLst>
-  </p:cSld>
-  <p:clrMapOvr>
-    <a:masterClrMapping/>
-  </p:clrMapOvr>
-  <p:timing>
-    <p:tnLst>
-      <p:par>
-        <p:cTn id="1" dur="indefinite" restart="never" nodeType="tmRoot"/>
-      </p:par>
-    </p:tnLst>
-  </p:timing>
-</p:sld>
-</file>
-
-<file path=ppt/slides/slide4.xml><?xml version="1.0" encoding="utf-8"?>
-<p:sld xmlns:a="http://schemas.openxmlformats.org/drawingml/2006/main" xmlns:r="http://schemas.openxmlformats.org/officeDocument/2006/relationships" xmlns:p="http://schemas.openxmlformats.org/presentationml/2006/main">
-  <p:cSld>
-    <p:spTree>
-      <p:nvGrpSpPr>
-        <p:cNvPr id="1" name=""/>
-        <p:cNvGrpSpPr/>
-        <p:nvPr/>
-      </p:nvGrpSpPr>
-      <p:grpSpPr>
-        <a:xfrm>
-          <a:off x="0" y="0"/>
-          <a:ext cx="0" cy="0"/>
-          <a:chOff x="0" y="0"/>
-          <a:chExt cx="0" cy="0"/>
-        </a:xfrm>
-      </p:grpSpPr>
-      <p:sp>
-        <p:nvSpPr>
-          <p:cNvPr id="4" name="Slide Number Placeholder 3"/>
-          <p:cNvSpPr>
-            <a:spLocks noGrp="1"/>
-          </p:cNvSpPr>
-          <p:nvPr>
-            <p:ph type="sldNum" sz="quarter" idx="12"/>
-          </p:nvPr>
-        </p:nvSpPr>
-        <p:spPr/>
-        <p:txBody>
-          <a:bodyPr/>
-          <a:lstStyle/>
-          <a:p>
-            <a:fld id="{27225834-A5F4-4780-A9FC-586FB30F9BB0}" type="slidenum">
-              <a:rPr lang="en-US" smtClean="0"/>
-              <a:t>4</a:t>
-            </a:fld>
-            <a:endParaRPr lang="en-US" dirty="0"/>
-          </a:p>
-        </p:txBody>
-      </p:sp>
-      <p:sp>
-        <p:nvSpPr>
-          <p:cNvPr id="19" name="TextBox 18"/>
-          <p:cNvSpPr txBox="1"/>
-          <p:nvPr/>
-        </p:nvSpPr>
-        <p:spPr>
-          <a:xfrm>
-            <a:off x="0" y="6352143"/>
-            <a:ext cx="6422592" cy="369332"/>
-          </a:xfrm>
-          <a:prstGeom prst="rect">
-            <a:avLst/>
-          </a:prstGeom>
-          <a:noFill/>
-        </p:spPr>
-        <p:txBody>
-          <a:bodyPr wrap="none" rtlCol="0">
-            <a:spAutoFit/>
-          </a:bodyPr>
-          <a:lstStyle/>
-          <a:p>
-            <a:r>
-              <a:rPr lang="en-US" dirty="0" smtClean="0">
-                <a:latin typeface="Times New Roman" panose="02020603050405020304" pitchFamily="18" charset="0"/>
-                <a:cs typeface="Times New Roman" panose="02020603050405020304" pitchFamily="18" charset="0"/>
-              </a:rPr>
-              <a:t>Portland State Aerospace Society | Electric Propellant Feed System</a:t>
-            </a:r>
-            <a:endParaRPr lang="en-US" dirty="0">
-              <a:latin typeface="Times New Roman" panose="02020603050405020304" pitchFamily="18" charset="0"/>
-              <a:cs typeface="Times New Roman" panose="02020603050405020304" pitchFamily="18" charset="0"/>
-            </a:endParaRPr>
-          </a:p>
-        </p:txBody>
-      </p:sp>
-    </p:spTree>
-    <p:extLst>
-      <p:ext uri="{BB962C8B-B14F-4D97-AF65-F5344CB8AC3E}">
-        <p14:creationId xmlns:p14="http://schemas.microsoft.com/office/powerpoint/2010/main" val="1587590204"/>
-      </p:ext>
-    </p:extLst>
-  </p:cSld>
-  <p:clrMapOvr>
-    <a:masterClrMapping/>
-  </p:clrMapOvr>
-  <p:timing>
-    <p:tnLst>
-      <p:par>
-        <p:cTn id="1" dur="indefinite" restart="never" nodeType="tmRoot"/>
-      </p:par>
-    </p:tnLst>
-  </p:timing>
-</p:sld>
-</file>
-
-<file path=ppt/slides/slide5.xml><?xml version="1.0" encoding="utf-8"?>
-<p:sld xmlns:a="http://schemas.openxmlformats.org/drawingml/2006/main" xmlns:r="http://schemas.openxmlformats.org/officeDocument/2006/relationships" xmlns:p="http://schemas.openxmlformats.org/presentationml/2006/main">
-  <p:cSld>
-    <p:spTree>
-      <p:nvGrpSpPr>
-        <p:cNvPr id="1" name=""/>
-        <p:cNvGrpSpPr/>
-        <p:nvPr/>
-      </p:nvGrpSpPr>
-      <p:grpSpPr>
-        <a:xfrm>
-          <a:off x="0" y="0"/>
-          <a:ext cx="0" cy="0"/>
-          <a:chOff x="0" y="0"/>
-          <a:chExt cx="0" cy="0"/>
-        </a:xfrm>
-      </p:grpSpPr>
-      <p:sp>
-        <p:nvSpPr>
-          <p:cNvPr id="4" name="Slide Number Placeholder 3"/>
-          <p:cNvSpPr>
-            <a:spLocks noGrp="1"/>
-          </p:cNvSpPr>
-          <p:nvPr>
-            <p:ph type="sldNum" sz="quarter" idx="12"/>
-          </p:nvPr>
-        </p:nvSpPr>
-        <p:spPr/>
-        <p:txBody>
-          <a:bodyPr/>
-          <a:lstStyle/>
-          <a:p>
-            <a:fld id="{27225834-A5F4-4780-A9FC-586FB30F9BB0}" type="slidenum">
-              <a:rPr lang="en-US" smtClean="0"/>
-              <a:t>5</a:t>
-            </a:fld>
-            <a:endParaRPr lang="en-US" dirty="0"/>
-          </a:p>
-        </p:txBody>
-      </p:sp>
-      <p:sp>
-        <p:nvSpPr>
-          <p:cNvPr id="19" name="TextBox 18"/>
-          <p:cNvSpPr txBox="1"/>
-          <p:nvPr/>
-        </p:nvSpPr>
-        <p:spPr>
-          <a:xfrm>
-            <a:off x="0" y="6352143"/>
-            <a:ext cx="6422592" cy="369332"/>
-          </a:xfrm>
-          <a:prstGeom prst="rect">
-            <a:avLst/>
-          </a:prstGeom>
-          <a:noFill/>
-        </p:spPr>
-        <p:txBody>
-          <a:bodyPr wrap="none" rtlCol="0">
-            <a:spAutoFit/>
-          </a:bodyPr>
-          <a:lstStyle/>
-          <a:p>
-            <a:r>
-              <a:rPr lang="en-US" dirty="0" smtClean="0">
-                <a:latin typeface="Times New Roman" panose="02020603050405020304" pitchFamily="18" charset="0"/>
-                <a:cs typeface="Times New Roman" panose="02020603050405020304" pitchFamily="18" charset="0"/>
-              </a:rPr>
-              <a:t>Portland State Aerospace Society | Electric Propellant Feed System</a:t>
-            </a:r>
-            <a:endParaRPr lang="en-US" dirty="0">
-              <a:latin typeface="Times New Roman" panose="02020603050405020304" pitchFamily="18" charset="0"/>
-              <a:cs typeface="Times New Roman" panose="02020603050405020304" pitchFamily="18" charset="0"/>
-            </a:endParaRPr>
-          </a:p>
-        </p:txBody>
-      </p:sp>
-    </p:spTree>
-    <p:extLst>
-      <p:ext uri="{BB962C8B-B14F-4D97-AF65-F5344CB8AC3E}">
-        <p14:creationId xmlns:p14="http://schemas.microsoft.com/office/powerpoint/2010/main" val="1842904921"/>
-      </p:ext>
-    </p:extLst>
-  </p:cSld>
-  <p:clrMapOvr>
-    <a:masterClrMapping/>
-  </p:clrMapOvr>
-  <p:timing>
-    <p:tnLst>
-      <p:par>
-        <p:cTn id="1" dur="indefinite" restart="never" nodeType="tmRoot"/>
-      </p:par>
-    </p:tnLst>
-  </p:timing>
-</p:sld>
-</file>
-
-<file path=ppt/slides/slide6.xml><?xml version="1.0" encoding="utf-8"?>
-<p:sld xmlns:a="http://schemas.openxmlformats.org/drawingml/2006/main" xmlns:r="http://schemas.openxmlformats.org/officeDocument/2006/relationships" xmlns:p="http://schemas.openxmlformats.org/presentationml/2006/main">
-  <p:cSld>
-    <p:spTree>
-      <p:nvGrpSpPr>
-        <p:cNvPr id="1" name=""/>
-        <p:cNvGrpSpPr/>
-        <p:nvPr/>
-      </p:nvGrpSpPr>
-      <p:grpSpPr>
-        <a:xfrm>
-          <a:off x="0" y="0"/>
-          <a:ext cx="0" cy="0"/>
-          <a:chOff x="0" y="0"/>
-          <a:chExt cx="0" cy="0"/>
-        </a:xfrm>
-      </p:grpSpPr>
-      <p:sp>
-        <p:nvSpPr>
-          <p:cNvPr id="4" name="Slide Number Placeholder 3"/>
-          <p:cNvSpPr>
-            <a:spLocks noGrp="1"/>
-          </p:cNvSpPr>
-          <p:nvPr>
-            <p:ph type="sldNum" sz="quarter" idx="12"/>
-          </p:nvPr>
-        </p:nvSpPr>
-        <p:spPr/>
-        <p:txBody>
-          <a:bodyPr/>
-          <a:lstStyle/>
-          <a:p>
-            <a:fld id="{27225834-A5F4-4780-A9FC-586FB30F9BB0}" type="slidenum">
-              <a:rPr lang="en-US" smtClean="0"/>
-              <a:t>6</a:t>
-            </a:fld>
-            <a:endParaRPr lang="en-US" dirty="0"/>
-          </a:p>
-        </p:txBody>
-      </p:sp>
-      <p:sp>
-        <p:nvSpPr>
-          <p:cNvPr id="19" name="TextBox 18"/>
-          <p:cNvSpPr txBox="1"/>
-          <p:nvPr/>
-        </p:nvSpPr>
-        <p:spPr>
-          <a:xfrm>
-            <a:off x="0" y="6352143"/>
-            <a:ext cx="6422592" cy="369332"/>
-          </a:xfrm>
-          <a:prstGeom prst="rect">
-            <a:avLst/>
-          </a:prstGeom>
-          <a:noFill/>
-        </p:spPr>
-        <p:txBody>
-          <a:bodyPr wrap="none" rtlCol="0">
-            <a:spAutoFit/>
-          </a:bodyPr>
-          <a:lstStyle/>
-          <a:p>
-            <a:r>
-              <a:rPr lang="en-US" dirty="0" smtClean="0">
-                <a:latin typeface="Times New Roman" panose="02020603050405020304" pitchFamily="18" charset="0"/>
-                <a:cs typeface="Times New Roman" panose="02020603050405020304" pitchFamily="18" charset="0"/>
-              </a:rPr>
-              <a:t>Portland State Aerospace Society | Electric Propellant Feed System</a:t>
-            </a:r>
-            <a:endParaRPr lang="en-US" dirty="0">
-              <a:latin typeface="Times New Roman" panose="02020603050405020304" pitchFamily="18" charset="0"/>
-              <a:cs typeface="Times New Roman" panose="02020603050405020304" pitchFamily="18" charset="0"/>
-            </a:endParaRPr>
-          </a:p>
-        </p:txBody>
-      </p:sp>
-    </p:spTree>
-    <p:extLst>
-      <p:ext uri="{BB962C8B-B14F-4D97-AF65-F5344CB8AC3E}">
-        <p14:creationId xmlns:p14="http://schemas.microsoft.com/office/powerpoint/2010/main" val="781473123"/>
       </p:ext>
     </p:extLst>
   </p:cSld>
@@ -4766,9 +4051,9 @@
         <a:latin typeface="Calibri Light" panose="020F0302020204030204"/>
         <a:ea typeface=""/>
         <a:cs typeface=""/>
-        <a:font script="Jpan" typeface="ＭＳ Ｐゴシック"/>
+        <a:font script="Jpan" typeface="游ゴシック Light"/>
         <a:font script="Hang" typeface="맑은 고딕"/>
-        <a:font script="Hans" typeface="宋体"/>
+        <a:font script="Hans" typeface="等线 Light"/>
         <a:font script="Hant" typeface="新細明體"/>
         <a:font script="Arab" typeface="Times New Roman"/>
         <a:font script="Hebr" typeface="Times New Roman"/>
@@ -4801,9 +4086,9 @@
         <a:latin typeface="Calibri" panose="020F0502020204030204"/>
         <a:ea typeface=""/>
         <a:cs typeface=""/>
-        <a:font script="Jpan" typeface="ＭＳ Ｐゴシック"/>
+        <a:font script="Jpan" typeface="游ゴシック"/>
         <a:font script="Hang" typeface="맑은 고딕"/>
-        <a:font script="Hans" typeface="宋体"/>
+        <a:font script="Hans" typeface="等线"/>
         <a:font script="Hant" typeface="新細明體"/>
         <a:font script="Arab" typeface="Arial"/>
         <a:font script="Hebr" typeface="Arial"/>

</xml_diff>